<commit_message>
added name in presentation, deleted comments
</commit_message>
<xml_diff>
--- a/presentation/first_draft.pptx
+++ b/presentation/first_draft.pptx
@@ -110,6 +110,11 @@
       </a:defRPr>
     </a:lvl9pPr>
   </p:defaultTextStyle>
+  <p:extLst>
+    <p:ext uri="{EFAFB233-063F-42B5-8137-9DF3F51BA10A}">
+      <p15:sldGuideLst xmlns:p15="http://schemas.microsoft.com/office/powerpoint/2012/main"/>
+    </p:ext>
+  </p:extLst>
 </p:presentation>
 </file>
 
@@ -195,7 +200,7 @@
           <a:p>
             <a:fld id="{3CC613AA-6A5A-4096-BFAC-2CFDA905BBF1}" type="datetimeFigureOut">
               <a:rPr lang="de-DE" smtClean="0"/>
-              <a:t>25.01.2026</a:t>
+              <a:t>26.01.2026</a:t>
             </a:fld>
             <a:endParaRPr lang="de-DE"/>
           </a:p>
@@ -859,7 +864,7 @@
           <a:p>
             <a:fld id="{5E92D9A2-1CB5-468C-ABD2-3554E8901FC9}" type="datetimeFigureOut">
               <a:rPr lang="de-DE" smtClean="0"/>
-              <a:t>25.01.2026</a:t>
+              <a:t>26.01.2026</a:t>
             </a:fld>
             <a:endParaRPr lang="de-DE"/>
           </a:p>
@@ -964,6 +969,13 @@
             <a:schemeClr val="lt1"/>
           </a:fontRef>
         </p:style>
+        <p:txBody>
+          <a:bodyPr/>
+          <a:lstStyle/>
+          <a:p>
+            <a:endParaRPr lang="de-DE"/>
+          </a:p>
+        </p:txBody>
       </p:sp>
     </p:spTree>
     <p:extLst>
@@ -1087,7 +1099,7 @@
           <a:p>
             <a:fld id="{5E92D9A2-1CB5-468C-ABD2-3554E8901FC9}" type="datetimeFigureOut">
               <a:rPr lang="de-DE" smtClean="0"/>
-              <a:t>25.01.2026</a:t>
+              <a:t>26.01.2026</a:t>
             </a:fld>
             <a:endParaRPr lang="de-DE"/>
           </a:p>
@@ -1267,7 +1279,7 @@
           <a:p>
             <a:fld id="{5E92D9A2-1CB5-468C-ABD2-3554E8901FC9}" type="datetimeFigureOut">
               <a:rPr lang="de-DE" smtClean="0"/>
-              <a:t>25.01.2026</a:t>
+              <a:t>26.01.2026</a:t>
             </a:fld>
             <a:endParaRPr lang="de-DE"/>
           </a:p>
@@ -1437,7 +1449,7 @@
           <a:p>
             <a:fld id="{5E92D9A2-1CB5-468C-ABD2-3554E8901FC9}" type="datetimeFigureOut">
               <a:rPr lang="de-DE" smtClean="0"/>
-              <a:t>25.01.2026</a:t>
+              <a:t>26.01.2026</a:t>
             </a:fld>
             <a:endParaRPr lang="de-DE"/>
           </a:p>
@@ -1691,7 +1703,7 @@
           <a:p>
             <a:fld id="{5E92D9A2-1CB5-468C-ABD2-3554E8901FC9}" type="datetimeFigureOut">
               <a:rPr lang="de-DE" smtClean="0"/>
-              <a:t>25.01.2026</a:t>
+              <a:t>26.01.2026</a:t>
             </a:fld>
             <a:endParaRPr lang="de-DE"/>
           </a:p>
@@ -2017,7 +2029,7 @@
           <a:p>
             <a:fld id="{5E92D9A2-1CB5-468C-ABD2-3554E8901FC9}" type="datetimeFigureOut">
               <a:rPr lang="de-DE" smtClean="0"/>
-              <a:t>25.01.2026</a:t>
+              <a:t>26.01.2026</a:t>
             </a:fld>
             <a:endParaRPr lang="de-DE"/>
           </a:p>
@@ -2468,7 +2480,7 @@
           <a:p>
             <a:fld id="{5E92D9A2-1CB5-468C-ABD2-3554E8901FC9}" type="datetimeFigureOut">
               <a:rPr lang="de-DE" smtClean="0"/>
-              <a:t>25.01.2026</a:t>
+              <a:t>26.01.2026</a:t>
             </a:fld>
             <a:endParaRPr lang="de-DE"/>
           </a:p>
@@ -2586,7 +2598,7 @@
           <a:p>
             <a:fld id="{5E92D9A2-1CB5-468C-ABD2-3554E8901FC9}" type="datetimeFigureOut">
               <a:rPr lang="de-DE" smtClean="0"/>
-              <a:t>25.01.2026</a:t>
+              <a:t>26.01.2026</a:t>
             </a:fld>
             <a:endParaRPr lang="de-DE"/>
           </a:p>
@@ -2681,7 +2693,7 @@
           <a:p>
             <a:fld id="{5E92D9A2-1CB5-468C-ABD2-3554E8901FC9}" type="datetimeFigureOut">
               <a:rPr lang="de-DE" smtClean="0"/>
-              <a:t>25.01.2026</a:t>
+              <a:t>26.01.2026</a:t>
             </a:fld>
             <a:endParaRPr lang="de-DE"/>
           </a:p>
@@ -2968,7 +2980,7 @@
           <a:p>
             <a:fld id="{5E92D9A2-1CB5-468C-ABD2-3554E8901FC9}" type="datetimeFigureOut">
               <a:rPr lang="de-DE" smtClean="0"/>
-              <a:t>25.01.2026</a:t>
+              <a:t>26.01.2026</a:t>
             </a:fld>
             <a:endParaRPr lang="de-DE"/>
           </a:p>
@@ -3290,7 +3302,7 @@
           <a:p>
             <a:fld id="{5E92D9A2-1CB5-468C-ABD2-3554E8901FC9}" type="datetimeFigureOut">
               <a:rPr lang="de-DE" smtClean="0"/>
-              <a:t>25.01.2026</a:t>
+              <a:t>26.01.2026</a:t>
             </a:fld>
             <a:endParaRPr lang="de-DE"/>
           </a:p>
@@ -3412,6 +3424,13 @@
             <a:schemeClr val="lt1"/>
           </a:fontRef>
         </p:style>
+        <p:txBody>
+          <a:bodyPr/>
+          <a:lstStyle/>
+          <a:p>
+            <a:endParaRPr lang="de-DE"/>
+          </a:p>
+        </p:txBody>
       </p:sp>
       <p:sp>
         <p:nvSpPr>
@@ -3544,7 +3563,7 @@
           <a:p>
             <a:fld id="{5E92D9A2-1CB5-468C-ABD2-3554E8901FC9}" type="datetimeFigureOut">
               <a:rPr lang="de-DE" smtClean="0"/>
-              <a:t>25.01.2026</a:t>
+              <a:t>26.01.2026</a:t>
             </a:fld>
             <a:endParaRPr lang="de-DE"/>
           </a:p>
@@ -4154,7 +4173,7 @@
           <a:p>
             <a:r>
               <a:rPr lang="de-DE" dirty="0"/>
-              <a:t>Leah …, Alexander Mayer und Rosina Engert</a:t>
+              <a:t>Leah Melchert, Alexander Mayer und Rosina Engert</a:t>
             </a:r>
           </a:p>
         </p:txBody>
@@ -4224,8 +4243,8 @@
           </a:xfrm>
         </p:spPr>
       </p:pic>
-      <mc:AlternateContent xmlns:mc="http://schemas.openxmlformats.org/markup-compatibility/2006">
-        <mc:Choice xmlns:a14="http://schemas.microsoft.com/office/drawing/2010/main" Requires="a14">
+      <mc:AlternateContent xmlns:mc="http://schemas.openxmlformats.org/markup-compatibility/2006" xmlns:a14="http://schemas.microsoft.com/office/drawing/2010/main">
+        <mc:Choice Requires="a14">
           <p:sp>
             <p:nvSpPr>
               <p:cNvPr id="30" name="Inhaltsplatzhalter 2">
@@ -4770,7 +4789,7 @@
             </p:txBody>
           </p:sp>
         </mc:Choice>
-        <mc:Fallback>
+        <mc:Fallback xmlns="">
           <p:sp>
             <p:nvSpPr>
               <p:cNvPr id="30" name="Inhaltsplatzhalter 2">

</xml_diff>